<commit_message>
Update CNN (Convolutional Neural Network).pptx
</commit_message>
<xml_diff>
--- a/Workshop_Slides/CNN (Convolutional Neural Network).pptx
+++ b/Workshop_Slides/CNN (Convolutional Neural Network).pptx
@@ -5,10 +5,10 @@
     <p:sldMasterId id="2147483660" r:id="rId1"/>
   </p:sldMasterIdLst>
   <p:notesMasterIdLst>
-    <p:notesMasterId r:id="rId14"/>
+    <p:notesMasterId r:id="rId15"/>
   </p:notesMasterIdLst>
   <p:handoutMasterIdLst>
-    <p:handoutMasterId r:id="rId15"/>
+    <p:handoutMasterId r:id="rId16"/>
   </p:handoutMasterIdLst>
   <p:sldIdLst>
     <p:sldId id="256" r:id="rId2"/>
@@ -22,7 +22,8 @@
     <p:sldId id="280" r:id="rId10"/>
     <p:sldId id="276" r:id="rId11"/>
     <p:sldId id="281" r:id="rId12"/>
-    <p:sldId id="282" r:id="rId13"/>
+    <p:sldId id="283" r:id="rId13"/>
+    <p:sldId id="282" r:id="rId14"/>
   </p:sldIdLst>
   <p:sldSz cx="12192000" cy="6858000"/>
   <p:notesSz cx="6858000" cy="9144000"/>
@@ -146,7 +147,7 @@
 <file path=ppt/revisionInfo.xml><?xml version="1.0" encoding="utf-8"?>
 <p1510:revInfo xmlns:a="http://schemas.openxmlformats.org/drawingml/2006/main" xmlns:r="http://schemas.openxmlformats.org/officeDocument/2006/relationships" xmlns:p1510="http://schemas.microsoft.com/office/powerpoint/2015/10/main">
   <p1510:revLst>
-    <p1510:client id="{523D8842-4856-4BE1-8F14-E5D5DB15DA03}" v="1" dt="2023-11-16T16:22:46.799"/>
+    <p1510:client id="{523D8842-4856-4BE1-8F14-E5D5DB15DA03}" v="4" dt="2023-11-16T21:32:48.237"/>
   </p1510:revLst>
 </p1510:revInfo>
 </file>
@@ -509,10 +510,33 @@
   <pc:docChgLst>
     <pc:chgData name="Vraj Patel" userId="472bd8f529c18977" providerId="LiveId" clId="{523D8842-4856-4BE1-8F14-E5D5DB15DA03}"/>
     <pc:docChg chg="custSel addSld modSld">
-      <pc:chgData name="Vraj Patel" userId="472bd8f529c18977" providerId="LiveId" clId="{523D8842-4856-4BE1-8F14-E5D5DB15DA03}" dt="2023-11-16T16:22:51.014" v="4" actId="26606"/>
+      <pc:chgData name="Vraj Patel" userId="472bd8f529c18977" providerId="LiveId" clId="{523D8842-4856-4BE1-8F14-E5D5DB15DA03}" dt="2023-11-16T21:32:52.949" v="26" actId="1076"/>
       <pc:docMkLst>
         <pc:docMk/>
       </pc:docMkLst>
+      <pc:sldChg chg="addSp delSp modSp mod">
+        <pc:chgData name="Vraj Patel" userId="472bd8f529c18977" providerId="LiveId" clId="{523D8842-4856-4BE1-8F14-E5D5DB15DA03}" dt="2023-11-16T21:26:51.735" v="16" actId="1076"/>
+        <pc:sldMkLst>
+          <pc:docMk/>
+          <pc:sldMk cId="1866740814" sldId="281"/>
+        </pc:sldMkLst>
+        <pc:spChg chg="add del mod">
+          <ac:chgData name="Vraj Patel" userId="472bd8f529c18977" providerId="LiveId" clId="{523D8842-4856-4BE1-8F14-E5D5DB15DA03}" dt="2023-11-16T21:26:22.344" v="7"/>
+          <ac:spMkLst>
+            <pc:docMk/>
+            <pc:sldMk cId="1866740814" sldId="281"/>
+            <ac:spMk id="3" creationId="{08E27D21-0606-404A-A475-4E1FF4229ADB}"/>
+          </ac:spMkLst>
+        </pc:spChg>
+        <pc:spChg chg="add mod">
+          <ac:chgData name="Vraj Patel" userId="472bd8f529c18977" providerId="LiveId" clId="{523D8842-4856-4BE1-8F14-E5D5DB15DA03}" dt="2023-11-16T21:26:51.735" v="16" actId="1076"/>
+          <ac:spMkLst>
+            <pc:docMk/>
+            <pc:sldMk cId="1866740814" sldId="281"/>
+            <ac:spMk id="4" creationId="{0A958447-4B1C-48DC-F22D-9F6D7843E419}"/>
+          </ac:spMkLst>
+        </pc:spChg>
+      </pc:sldChg>
       <pc:sldChg chg="addSp delSp modSp new mod setBg setClrOvrMap">
         <pc:chgData name="Vraj Patel" userId="472bd8f529c18977" providerId="LiveId" clId="{523D8842-4856-4BE1-8F14-E5D5DB15DA03}" dt="2023-11-16T16:22:51.014" v="4" actId="26606"/>
         <pc:sldMkLst>
@@ -543,6 +567,29 @@
             <ac:picMk id="1026" creationId="{0D7595B6-CB67-39F1-652D-A9C00214076B}"/>
           </ac:picMkLst>
         </pc:picChg>
+      </pc:sldChg>
+      <pc:sldChg chg="modSp new mod">
+        <pc:chgData name="Vraj Patel" userId="472bd8f529c18977" providerId="LiveId" clId="{523D8842-4856-4BE1-8F14-E5D5DB15DA03}" dt="2023-11-16T21:32:52.949" v="26" actId="1076"/>
+        <pc:sldMkLst>
+          <pc:docMk/>
+          <pc:sldMk cId="3728294068" sldId="283"/>
+        </pc:sldMkLst>
+        <pc:spChg chg="mod">
+          <ac:chgData name="Vraj Patel" userId="472bd8f529c18977" providerId="LiveId" clId="{523D8842-4856-4BE1-8F14-E5D5DB15DA03}" dt="2023-11-16T21:29:40.837" v="23" actId="20577"/>
+          <ac:spMkLst>
+            <pc:docMk/>
+            <pc:sldMk cId="3728294068" sldId="283"/>
+            <ac:spMk id="2" creationId="{B9D33DF8-4E15-6F23-4D91-D2B8469234C1}"/>
+          </ac:spMkLst>
+        </pc:spChg>
+        <pc:spChg chg="mod">
+          <ac:chgData name="Vraj Patel" userId="472bd8f529c18977" providerId="LiveId" clId="{523D8842-4856-4BE1-8F14-E5D5DB15DA03}" dt="2023-11-16T21:32:52.949" v="26" actId="1076"/>
+          <ac:spMkLst>
+            <pc:docMk/>
+            <pc:sldMk cId="3728294068" sldId="283"/>
+            <ac:spMk id="3" creationId="{0350070F-8977-C44A-E7D4-D3EB3E4C54A8}"/>
+          </ac:spMkLst>
+        </pc:spChg>
       </pc:sldChg>
     </pc:docChg>
   </pc:docChgLst>
@@ -9465,6 +9512,41 @@
           </a:p>
         </p:txBody>
       </p:sp>
+      <p:sp>
+        <p:nvSpPr>
+          <p:cNvPr id="4" name="TextBox 3">
+            <a:extLst>
+              <a:ext uri="{FF2B5EF4-FFF2-40B4-BE49-F238E27FC236}">
+                <a16:creationId xmlns:a16="http://schemas.microsoft.com/office/drawing/2014/main" id="{0A958447-4B1C-48DC-F22D-9F6D7843E419}"/>
+              </a:ext>
+            </a:extLst>
+          </p:cNvPr>
+          <p:cNvSpPr txBox="1"/>
+          <p:nvPr/>
+        </p:nvSpPr>
+        <p:spPr>
+          <a:xfrm>
+            <a:off x="2783632" y="4170481"/>
+            <a:ext cx="10369152" cy="369332"/>
+          </a:xfrm>
+          <a:prstGeom prst="rect">
+            <a:avLst/>
+          </a:prstGeom>
+          <a:noFill/>
+        </p:spPr>
+        <p:txBody>
+          <a:bodyPr wrap="square" rtlCol="0">
+            <a:spAutoFit/>
+          </a:bodyPr>
+          <a:lstStyle/>
+          <a:p>
+            <a:r>
+              <a:rPr lang="en-CA" dirty="0"/>
+              <a:t>Link: https://github.com/ConnorUsaty/MacAIEducation2023</a:t>
+            </a:r>
+          </a:p>
+        </p:txBody>
+      </p:sp>
     </p:spTree>
     <p:extLst>
       <p:ext uri="{BB962C8B-B14F-4D97-AF65-F5344CB8AC3E}">
@@ -9479,6 +9561,103 @@
 </file>
 
 <file path=ppt/slides/slide12.xml><?xml version="1.0" encoding="utf-8"?>
+<p:sld xmlns:a="http://schemas.openxmlformats.org/drawingml/2006/main" xmlns:r="http://schemas.openxmlformats.org/officeDocument/2006/relationships" xmlns:p="http://schemas.openxmlformats.org/presentationml/2006/main">
+  <p:cSld>
+    <p:spTree>
+      <p:nvGrpSpPr>
+        <p:cNvPr id="1" name=""/>
+        <p:cNvGrpSpPr/>
+        <p:nvPr/>
+      </p:nvGrpSpPr>
+      <p:grpSpPr>
+        <a:xfrm>
+          <a:off x="0" y="0"/>
+          <a:ext cx="0" cy="0"/>
+          <a:chOff x="0" y="0"/>
+          <a:chExt cx="0" cy="0"/>
+        </a:xfrm>
+      </p:grpSpPr>
+      <p:sp>
+        <p:nvSpPr>
+          <p:cNvPr id="2" name="Title 1">
+            <a:extLst>
+              <a:ext uri="{FF2B5EF4-FFF2-40B4-BE49-F238E27FC236}">
+                <a16:creationId xmlns:a16="http://schemas.microsoft.com/office/drawing/2014/main" id="{B9D33DF8-4E15-6F23-4D91-D2B8469234C1}"/>
+              </a:ext>
+            </a:extLst>
+          </p:cNvPr>
+          <p:cNvSpPr>
+            <a:spLocks noGrp="1"/>
+          </p:cNvSpPr>
+          <p:nvPr>
+            <p:ph type="title"/>
+          </p:nvPr>
+        </p:nvSpPr>
+        <p:spPr/>
+        <p:txBody>
+          <a:bodyPr/>
+          <a:lstStyle/>
+          <a:p>
+            <a:r>
+              <a:rPr lang="en-CA" dirty="0"/>
+              <a:t>Kahoot</a:t>
+            </a:r>
+          </a:p>
+        </p:txBody>
+      </p:sp>
+      <p:sp>
+        <p:nvSpPr>
+          <p:cNvPr id="3" name="Text Placeholder 2">
+            <a:extLst>
+              <a:ext uri="{FF2B5EF4-FFF2-40B4-BE49-F238E27FC236}">
+                <a16:creationId xmlns:a16="http://schemas.microsoft.com/office/drawing/2014/main" id="{0350070F-8977-C44A-E7D4-D3EB3E4C54A8}"/>
+              </a:ext>
+            </a:extLst>
+          </p:cNvPr>
+          <p:cNvSpPr>
+            <a:spLocks noGrp="1"/>
+          </p:cNvSpPr>
+          <p:nvPr>
+            <p:ph type="body" idx="1"/>
+          </p:nvPr>
+        </p:nvSpPr>
+        <p:spPr>
+          <a:xfrm>
+            <a:off x="1631504" y="5013176"/>
+            <a:ext cx="9052560" cy="1066800"/>
+          </a:xfrm>
+        </p:spPr>
+        <p:txBody>
+          <a:bodyPr/>
+          <a:lstStyle/>
+          <a:p>
+            <a:r>
+              <a:rPr lang="en-CA" dirty="0">
+                <a:hlinkClick r:id="rId2"/>
+              </a:rPr>
+              <a:t>https://create.kahoot.it/share/convolutional-neural-network/2afe490f-eabd-4859-ab14-fdac31db49c7</a:t>
+            </a:r>
+            <a:endParaRPr lang="en-CA" dirty="0"/>
+          </a:p>
+          <a:p>
+            <a:endParaRPr lang="en-CA" dirty="0"/>
+          </a:p>
+        </p:txBody>
+      </p:sp>
+    </p:spTree>
+    <p:extLst>
+      <p:ext uri="{BB962C8B-B14F-4D97-AF65-F5344CB8AC3E}">
+        <p14:creationId xmlns:p14="http://schemas.microsoft.com/office/powerpoint/2010/main" val="3728294068"/>
+      </p:ext>
+    </p:extLst>
+  </p:cSld>
+  <p:clrMapOvr>
+    <a:masterClrMapping/>
+  </p:clrMapOvr>
+</p:sld>
+</file>
+
+<file path=ppt/slides/slide13.xml><?xml version="1.0" encoding="utf-8"?>
 <p:sld xmlns:a="http://schemas.openxmlformats.org/drawingml/2006/main" xmlns:r="http://schemas.openxmlformats.org/officeDocument/2006/relationships" xmlns:p="http://schemas.openxmlformats.org/presentationml/2006/main">
   <p:cSld>
     <p:bg>

</xml_diff>